<commit_message>
Removing issues from bad merge. seeds.rb still needs to be fixed to make some of the feature tests work again.
</commit_message>
<xml_diff>
--- a/doc/Health Copilot.pptx
+++ b/doc/Health Copilot.pptx
@@ -6357,11 +6357,17 @@
             <p:ph type="ctrTitle"/>
           </p:nvPr>
         </p:nvSpPr>
-        <p:spPr/>
+        <p:spPr>
+          <a:xfrm>
+            <a:off x="685800" y="608639"/>
+            <a:ext cx="7772400" cy="1829761"/>
+          </a:xfrm>
+        </p:spPr>
         <p:txBody>
           <a:bodyPr/>
           <a:lstStyle/>
           <a:p>
+            <a:pPr algn="ctr"/>
             <a:r>
               <a:rPr lang="en-US" dirty="0"/>
               <a:t>Health Copilot </a:t>
@@ -6384,39 +6390,46 @@
             <p:ph type="subTitle" idx="1"/>
           </p:nvPr>
         </p:nvSpPr>
-        <p:spPr/>
+        <p:spPr>
+          <a:xfrm>
+            <a:off x="685800" y="2686496"/>
+            <a:ext cx="7772400" cy="1199704"/>
+          </a:xfrm>
+        </p:spPr>
         <p:txBody>
           <a:bodyPr>
-            <a:normAutofit fontScale="62500" lnSpcReduction="20000"/>
+            <a:noAutofit/>
           </a:bodyPr>
           <a:lstStyle/>
           <a:p>
-            <a:endParaRPr lang="en-US" dirty="0" smtClean="0"/>
-          </a:p>
-          <a:p>
-            <a:r>
-              <a:rPr lang="en-US" dirty="0" smtClean="0"/>
+            <a:pPr algn="ctr"/>
+            <a:endParaRPr lang="en-US" sz="2000" dirty="0" smtClean="0"/>
+          </a:p>
+          <a:p>
+            <a:pPr algn="ctr"/>
+            <a:r>
+              <a:rPr lang="en-US" sz="2000" dirty="0" smtClean="0"/>
               <a:t>Stephen Durham, </a:t>
             </a:r>
             <a:br>
-              <a:rPr lang="en-US" dirty="0" smtClean="0"/>
+              <a:rPr lang="en-US" sz="2000" dirty="0" smtClean="0"/>
             </a:br>
             <a:r>
-              <a:rPr lang="en-US" dirty="0" smtClean="0"/>
+              <a:rPr lang="en-US" sz="2000" dirty="0" smtClean="0"/>
               <a:t>Eric Eldridge, </a:t>
             </a:r>
             <a:br>
-              <a:rPr lang="en-US" dirty="0" smtClean="0"/>
+              <a:rPr lang="en-US" sz="2000" dirty="0" smtClean="0"/>
             </a:br>
             <a:r>
-              <a:rPr lang="en-US" dirty="0" smtClean="0"/>
+              <a:rPr lang="en-US" sz="2000" dirty="0" smtClean="0"/>
               <a:t>Justin Essian, </a:t>
             </a:r>
             <a:br>
-              <a:rPr lang="en-US" dirty="0" smtClean="0"/>
+              <a:rPr lang="en-US" sz="2000" dirty="0" smtClean="0"/>
             </a:br>
             <a:r>
-              <a:rPr lang="en-US" dirty="0" smtClean="0"/>
+              <a:rPr lang="en-US" sz="2000" dirty="0" smtClean="0"/>
               <a:t>Brian Rossman</a:t>
             </a:r>
           </a:p>
@@ -8192,7 +8205,11 @@
           <a:p>
             <a:r>
               <a:rPr lang="en-US" dirty="0" smtClean="0"/>
-              <a:t>List Recipes MVC Module</a:t>
+              <a:t>Recipes </a:t>
+            </a:r>
+            <a:r>
+              <a:rPr lang="en-US" dirty="0" smtClean="0"/>
+              <a:t>MVC Module</a:t>
             </a:r>
           </a:p>
           <a:p>
@@ -8226,6 +8243,21 @@
           </a:p>
           <a:p>
             <a:r>
+              <a:rPr lang="en-US" smtClean="0"/>
+              <a:t>Scheduling</a:t>
+            </a:r>
+            <a:r>
+              <a:rPr kumimoji="0" lang="en-US" sz="2700" kern="1200" smtClean="0">
+                <a:solidFill>
+                  <a:schemeClr val="tx1"/>
+                </a:solidFill>
+                <a:latin typeface="+mn-lt"/>
+                <a:ea typeface="+mn-ea"/>
+                <a:cs typeface="+mn-cs"/>
+              </a:rPr>
+              <a:t> </a:t>
+            </a:r>
+            <a:r>
               <a:rPr kumimoji="0" lang="en-US" sz="2700" kern="1200" dirty="0" smtClean="0">
                 <a:solidFill>
                   <a:schemeClr val="tx1"/>
@@ -8234,24 +8266,7 @@
                 <a:ea typeface="+mn-ea"/>
                 <a:cs typeface="+mn-cs"/>
               </a:rPr>
-              <a:t>Recipe Toolbox MVC Module</a:t>
-            </a:r>
-          </a:p>
-          <a:p>
-            <a:r>
-              <a:rPr lang="en-US" dirty="0" smtClean="0"/>
-              <a:t>Scheduling</a:t>
-            </a:r>
-            <a:r>
-              <a:rPr kumimoji="0" lang="en-US" sz="2700" kern="1200" dirty="0" smtClean="0">
-                <a:solidFill>
-                  <a:schemeClr val="tx1"/>
-                </a:solidFill>
-                <a:latin typeface="+mn-lt"/>
-                <a:ea typeface="+mn-ea"/>
-                <a:cs typeface="+mn-cs"/>
-              </a:rPr>
-              <a:t> MVC Module</a:t>
+              <a:t>MVC Module</a:t>
             </a:r>
           </a:p>
           <a:p>

</xml_diff>